<commit_message>
updated images: changed classes to individuals
</commit_message>
<xml_diff>
--- a/documents/presentations/2013/ELSEweb-EDAC-PROV.pptx
+++ b/documents/presentations/2013/ELSEweb-EDAC-PROV.pptx
@@ -5,15 +5,16 @@
     <p:sldMasterId id="2147483648" r:id="rId1"/>
   </p:sldMasterIdLst>
   <p:notesMasterIdLst>
-    <p:notesMasterId r:id="rId8"/>
+    <p:notesMasterId r:id="rId9"/>
   </p:notesMasterIdLst>
   <p:sldIdLst>
     <p:sldId id="256" r:id="rId2"/>
     <p:sldId id="259" r:id="rId3"/>
     <p:sldId id="262" r:id="rId4"/>
-    <p:sldId id="257" r:id="rId5"/>
-    <p:sldId id="260" r:id="rId6"/>
-    <p:sldId id="261" r:id="rId7"/>
+    <p:sldId id="263" r:id="rId5"/>
+    <p:sldId id="257" r:id="rId6"/>
+    <p:sldId id="260" r:id="rId7"/>
+    <p:sldId id="261" r:id="rId8"/>
   </p:sldIdLst>
   <p:sldSz cx="9144000" cy="6858000" type="screen4x3"/>
   <p:notesSz cx="6858000" cy="9144000"/>
@@ -530,7 +531,7 @@
           <a:p>
             <a:fld id="{850082F7-6A96-6342-BC39-5A2CF5FDAFF6}" type="slidenum">
               <a:rPr lang="en-US" smtClean="0"/>
-              <a:t>6</a:t>
+              <a:t>7</a:t>
             </a:fld>
             <a:endParaRPr lang="en-US"/>
           </a:p>
@@ -3669,8 +3670,17 @@
           <a:p>
             <a:r>
               <a:rPr lang="en-US" dirty="0" smtClean="0"/>
-              <a:t>Context</a:t>
-            </a:r>
+              <a:t>Background</a:t>
+            </a:r>
+            <a:endParaRPr lang="en-US" dirty="0" smtClean="0"/>
+          </a:p>
+          <a:p>
+            <a:pPr lvl="1"/>
+            <a:r>
+              <a:rPr lang="en-US" dirty="0" smtClean="0"/>
+              <a:t>OBOE</a:t>
+            </a:r>
+            <a:endParaRPr lang="en-US" dirty="0" smtClean="0"/>
           </a:p>
           <a:p>
             <a:pPr lvl="1"/>
@@ -3680,20 +3690,8 @@
             </a:r>
             <a:r>
               <a:rPr lang="en-US" dirty="0" smtClean="0"/>
-              <a:t>Data </a:t>
-            </a:r>
-            <a:r>
-              <a:rPr lang="en-US" dirty="0" smtClean="0"/>
-              <a:t>Model (Graphical + actual RDF from slides)</a:t>
-            </a:r>
-          </a:p>
-          <a:p>
-            <a:pPr lvl="1"/>
-            <a:r>
-              <a:rPr lang="en-US" dirty="0" smtClean="0"/>
-              <a:t>OBOE</a:t>
-            </a:r>
-            <a:endParaRPr lang="en-US" dirty="0" smtClean="0"/>
+              <a:t>Data Model (Graphical + actual RDF from slides)</a:t>
+            </a:r>
           </a:p>
           <a:p>
             <a:pPr lvl="1"/>
@@ -3707,11 +3705,7 @@
             </a:r>
             <a:r>
               <a:rPr lang="en-US" dirty="0" smtClean="0"/>
-              <a:t>Scenario Data </a:t>
-            </a:r>
-            <a:r>
-              <a:rPr lang="en-US" dirty="0" smtClean="0"/>
-              <a:t>Model</a:t>
+              <a:t>Scenario Data Model</a:t>
             </a:r>
           </a:p>
           <a:p>
@@ -3738,11 +3732,7 @@
             <a:pPr lvl="1"/>
             <a:r>
               <a:rPr lang="en-US" dirty="0" smtClean="0"/>
-              <a:t>PROV and </a:t>
-            </a:r>
-            <a:r>
-              <a:rPr lang="en-US" dirty="0" smtClean="0"/>
-              <a:t>Example RDF</a:t>
+              <a:t>PROV and Example RDF</a:t>
             </a:r>
           </a:p>
           <a:p>
@@ -3786,13 +3776,8 @@
           <a:p>
             <a:r>
               <a:rPr lang="en-US" dirty="0" smtClean="0"/>
-              <a:t>How to generate it</a:t>
-            </a:r>
-            <a:r>
-              <a:rPr lang="en-US" smtClean="0"/>
-              <a:t>: Provo King</a:t>
-            </a:r>
-            <a:endParaRPr lang="en-US" dirty="0" smtClean="0"/>
+              <a:t>How to generate it: Provo King</a:t>
+            </a:r>
           </a:p>
         </p:txBody>
       </p:sp>
@@ -3841,7 +3826,11 @@
           <a:bodyPr/>
           <a:lstStyle/>
           <a:p>
-            <a:endParaRPr lang="en-US"/>
+            <a:r>
+              <a:rPr lang="en-US" dirty="0" smtClean="0"/>
+              <a:t>OBOE: Observational Ontology</a:t>
+            </a:r>
+            <a:endParaRPr lang="en-US" dirty="0"/>
           </a:p>
         </p:txBody>
       </p:sp>
@@ -3911,6 +3900,78 @@
           <a:p>
             <a:r>
               <a:rPr lang="en-US" dirty="0" smtClean="0"/>
+              <a:t>DCAT: Data Catalog</a:t>
+            </a:r>
+            <a:endParaRPr lang="en-US" dirty="0"/>
+          </a:p>
+        </p:txBody>
+      </p:sp>
+      <p:sp>
+        <p:nvSpPr>
+          <p:cNvPr id="3" name="Content Placeholder 2"/>
+          <p:cNvSpPr>
+            <a:spLocks noGrp="1"/>
+          </p:cNvSpPr>
+          <p:nvPr>
+            <p:ph idx="1"/>
+          </p:nvPr>
+        </p:nvSpPr>
+        <p:spPr/>
+        <p:txBody>
+          <a:bodyPr/>
+          <a:lstStyle/>
+          <a:p>
+            <a:endParaRPr lang="en-US" dirty="0"/>
+          </a:p>
+        </p:txBody>
+      </p:sp>
+    </p:spTree>
+    <p:extLst>
+      <p:ext uri="{BB962C8B-B14F-4D97-AF65-F5344CB8AC3E}">
+        <p14:creationId xmlns:p14="http://schemas.microsoft.com/office/powerpoint/2010/main" val="665048687"/>
+      </p:ext>
+    </p:extLst>
+  </p:cSld>
+  <p:clrMapOvr>
+    <a:masterClrMapping/>
+  </p:clrMapOvr>
+</p:sld>
+</file>
+
+<file path=ppt/slides/slide5.xml><?xml version="1.0" encoding="utf-8"?>
+<p:sld xmlns:a="http://schemas.openxmlformats.org/drawingml/2006/main" xmlns:r="http://schemas.openxmlformats.org/officeDocument/2006/relationships" xmlns:p="http://schemas.openxmlformats.org/presentationml/2006/main">
+  <p:cSld>
+    <p:spTree>
+      <p:nvGrpSpPr>
+        <p:cNvPr id="1" name=""/>
+        <p:cNvGrpSpPr/>
+        <p:nvPr/>
+      </p:nvGrpSpPr>
+      <p:grpSpPr>
+        <a:xfrm>
+          <a:off x="0" y="0"/>
+          <a:ext cx="0" cy="0"/>
+          <a:chOff x="0" y="0"/>
+          <a:chExt cx="0" cy="0"/>
+        </a:xfrm>
+      </p:grpSpPr>
+      <p:sp>
+        <p:nvSpPr>
+          <p:cNvPr id="2" name="Title 1"/>
+          <p:cNvSpPr>
+            <a:spLocks noGrp="1"/>
+          </p:cNvSpPr>
+          <p:nvPr>
+            <p:ph type="title"/>
+          </p:nvPr>
+        </p:nvSpPr>
+        <p:spPr/>
+        <p:txBody>
+          <a:bodyPr/>
+          <a:lstStyle/>
+          <a:p>
+            <a:r>
+              <a:rPr lang="en-US" dirty="0" smtClean="0"/>
               <a:t>PROV Data Model</a:t>
             </a:r>
             <a:endParaRPr lang="en-US" dirty="0"/>
@@ -3954,7 +4015,7 @@
 </p:sld>
 </file>
 
-<file path=ppt/slides/slide5.xml><?xml version="1.0" encoding="utf-8"?>
+<file path=ppt/slides/slide6.xml><?xml version="1.0" encoding="utf-8"?>
 <p:sld xmlns:a="http://schemas.openxmlformats.org/drawingml/2006/main" xmlns:r="http://schemas.openxmlformats.org/officeDocument/2006/relationships" xmlns:p="http://schemas.openxmlformats.org/presentationml/2006/main">
   <p:cSld>
     <p:spTree>
@@ -4608,7 +4669,7 @@
 </p:sld>
 </file>
 
-<file path=ppt/slides/slide6.xml><?xml version="1.0" encoding="utf-8"?>
+<file path=ppt/slides/slide7.xml><?xml version="1.0" encoding="utf-8"?>
 <p:sld xmlns:a="http://schemas.openxmlformats.org/drawingml/2006/main" xmlns:r="http://schemas.openxmlformats.org/officeDocument/2006/relationships" xmlns:p="http://schemas.openxmlformats.org/presentationml/2006/main">
   <p:cSld>
     <p:spTree>

</xml_diff>

<commit_message>
Updated presentation and prov trace corrected by Soren
</commit_message>
<xml_diff>
--- a/documents/presentations/2013/ELSEweb-EDAC-PROV.pptx
+++ b/documents/presentations/2013/ELSEweb-EDAC-PROV.pptx
@@ -5,10 +5,10 @@
     <p:sldMasterId id="2147483648" r:id="rId1"/>
   </p:sldMasterIdLst>
   <p:notesMasterIdLst>
-    <p:notesMasterId r:id="rId22"/>
+    <p:notesMasterId r:id="rId23"/>
   </p:notesMasterIdLst>
   <p:handoutMasterIdLst>
-    <p:handoutMasterId r:id="rId23"/>
+    <p:handoutMasterId r:id="rId24"/>
   </p:handoutMasterIdLst>
   <p:sldIdLst>
     <p:sldId id="256" r:id="rId2"/>
@@ -31,6 +31,7 @@
     <p:sldId id="278" r:id="rId19"/>
     <p:sldId id="279" r:id="rId20"/>
     <p:sldId id="271" r:id="rId21"/>
+    <p:sldId id="280" r:id="rId22"/>
   </p:sldIdLst>
   <p:sldSz cx="9144000" cy="6858000" type="screen4x3"/>
   <p:notesSz cx="6858000" cy="9144000"/>
@@ -3846,6 +3847,13 @@
   <p:clrMapOvr>
     <a:masterClrMapping/>
   </p:clrMapOvr>
+  <p:timing>
+    <p:tnLst>
+      <p:par>
+        <p:cTn xmlns:p14="http://schemas.microsoft.com/office/powerpoint/2010/main" id="1" dur="indefinite" restart="never" nodeType="tmRoot"/>
+      </p:par>
+    </p:tnLst>
+  </p:timing>
 </p:sld>
 </file>
 
@@ -4088,9 +4096,6 @@
               </a:rPr>
               <a:t>&gt;</a:t>
             </a:r>
-            <a:endParaRPr lang="en-US" b="1" dirty="0">
-              <a:latin typeface="Constantia" charset="0"/>
-            </a:endParaRPr>
           </a:p>
         </p:txBody>
       </p:sp>
@@ -4329,9 +4334,6 @@
               </a:rPr>
               <a:t>&gt;</a:t>
             </a:r>
-            <a:endParaRPr lang="en-US" dirty="0">
-              <a:latin typeface="Constantia" charset="0"/>
-            </a:endParaRPr>
           </a:p>
         </p:txBody>
       </p:sp>
@@ -4368,6 +4370,13 @@
   <p:clrMapOvr>
     <a:masterClrMapping/>
   </p:clrMapOvr>
+  <p:timing>
+    <p:tnLst>
+      <p:par>
+        <p:cTn xmlns:p14="http://schemas.microsoft.com/office/powerpoint/2010/main" id="1" dur="indefinite" restart="never" nodeType="tmRoot"/>
+      </p:par>
+    </p:tnLst>
+  </p:timing>
 </p:sld>
 </file>
 
@@ -4886,9 +4895,6 @@
               </a:rPr>
               <a:t>&gt;</a:t>
             </a:r>
-            <a:endParaRPr lang="en-US" dirty="0">
-              <a:latin typeface="Constantia" charset="0"/>
-            </a:endParaRPr>
           </a:p>
         </p:txBody>
       </p:sp>
@@ -4925,6 +4931,13 @@
   <p:clrMapOvr>
     <a:masterClrMapping/>
   </p:clrMapOvr>
+  <p:timing>
+    <p:tnLst>
+      <p:par>
+        <p:cTn xmlns:p14="http://schemas.microsoft.com/office/powerpoint/2010/main" id="1" dur="indefinite" restart="never" nodeType="tmRoot"/>
+      </p:par>
+    </p:tnLst>
+  </p:timing>
 </p:sld>
 </file>
 
@@ -5005,8 +5018,8 @@
               <a:t>Currently, 65 </a:t>
             </a:r>
             <a:r>
-              <a:rPr lang="en-US" sz="2800" dirty="0" err="1" smtClean="0"/>
-              <a:t>impementations</a:t>
+              <a:rPr lang="en-US" sz="2800" dirty="0" smtClean="0"/>
+              <a:t>implementations</a:t>
             </a:r>
             <a:endParaRPr lang="en-US" sz="2800" dirty="0" smtClean="0"/>
           </a:p>
@@ -5300,6 +5313,13 @@
   <p:clrMapOvr>
     <a:masterClrMapping/>
   </p:clrMapOvr>
+  <p:timing>
+    <p:tnLst>
+      <p:par>
+        <p:cTn xmlns:p14="http://schemas.microsoft.com/office/powerpoint/2010/main" id="1" dur="indefinite" restart="never" nodeType="tmRoot"/>
+      </p:par>
+    </p:tnLst>
+  </p:timing>
 </p:sld>
 </file>
 
@@ -5368,8 +5388,13 @@
             </a:r>
             <a:r>
               <a:rPr lang="en-US" dirty="0" smtClean="0"/>
-              <a:t>observation concerns</a:t>
-            </a:r>
+              <a:t>observation </a:t>
+            </a:r>
+            <a:r>
+              <a:rPr lang="en-US" dirty="0" smtClean="0"/>
+              <a:t>concerns (OBOE)</a:t>
+            </a:r>
+            <a:endParaRPr lang="en-US" dirty="0" smtClean="0"/>
           </a:p>
           <a:p>
             <a:pPr lvl="1"/>
@@ -5393,8 +5418,13 @@
           <a:p>
             <a:r>
               <a:rPr lang="en-US" dirty="0" smtClean="0"/>
-              <a:t>MUST support acquisition concerns</a:t>
-            </a:r>
+              <a:t>MUST support acquisition </a:t>
+            </a:r>
+            <a:r>
+              <a:rPr lang="en-US" dirty="0" smtClean="0"/>
+              <a:t>concerns (DCAT)</a:t>
+            </a:r>
+            <a:endParaRPr lang="en-US" dirty="0" smtClean="0"/>
           </a:p>
           <a:p>
             <a:pPr lvl="1"/>
@@ -5410,8 +5440,13 @@
           <a:p>
             <a:r>
               <a:rPr lang="en-US" dirty="0" smtClean="0"/>
-              <a:t>MUST support provenance concerns</a:t>
-            </a:r>
+              <a:t>MUST support provenance </a:t>
+            </a:r>
+            <a:r>
+              <a:rPr lang="en-US" dirty="0" smtClean="0"/>
+              <a:t>concerns (PROV-O)</a:t>
+            </a:r>
+            <a:endParaRPr lang="en-US" dirty="0" smtClean="0"/>
           </a:p>
           <a:p>
             <a:r>
@@ -5458,6 +5493,13 @@
   <p:clrMapOvr>
     <a:masterClrMapping/>
   </p:clrMapOvr>
+  <p:timing>
+    <p:tnLst>
+      <p:par>
+        <p:cTn xmlns:p14="http://schemas.microsoft.com/office/powerpoint/2010/main" id="1" dur="indefinite" restart="never" nodeType="tmRoot"/>
+      </p:par>
+    </p:tnLst>
+  </p:timing>
 </p:sld>
 </file>
 
@@ -5592,6 +5634,13 @@
   <p:clrMapOvr>
     <a:masterClrMapping/>
   </p:clrMapOvr>
+  <p:timing>
+    <p:tnLst>
+      <p:par>
+        <p:cTn xmlns:p14="http://schemas.microsoft.com/office/powerpoint/2010/main" id="1" dur="indefinite" restart="never" nodeType="tmRoot"/>
+      </p:par>
+    </p:tnLst>
+  </p:timing>
 </p:sld>
 </file>
 
@@ -5831,6 +5880,13 @@
   <p:clrMapOvr>
     <a:masterClrMapping/>
   </p:clrMapOvr>
+  <p:timing>
+    <p:tnLst>
+      <p:par>
+        <p:cTn xmlns:p14="http://schemas.microsoft.com/office/powerpoint/2010/main" id="1" dur="indefinite" restart="never" nodeType="tmRoot"/>
+      </p:par>
+    </p:tnLst>
+  </p:timing>
 </p:sld>
 </file>
 
@@ -5931,6 +5987,13 @@
   <p:clrMapOvr>
     <a:masterClrMapping/>
   </p:clrMapOvr>
+  <p:timing>
+    <p:tnLst>
+      <p:par>
+        <p:cTn xmlns:p14="http://schemas.microsoft.com/office/powerpoint/2010/main" id="1" dur="indefinite" restart="never" nodeType="tmRoot"/>
+      </p:par>
+    </p:tnLst>
+  </p:timing>
 </p:sld>
 </file>
 
@@ -6031,6 +6094,13 @@
   <p:clrMapOvr>
     <a:masterClrMapping/>
   </p:clrMapOvr>
+  <p:timing>
+    <p:tnLst>
+      <p:par>
+        <p:cTn xmlns:p14="http://schemas.microsoft.com/office/powerpoint/2010/main" id="1" dur="indefinite" restart="never" nodeType="tmRoot"/>
+      </p:par>
+    </p:tnLst>
+  </p:timing>
 </p:sld>
 </file>
 
@@ -6099,7 +6169,7 @@
       </p:sp>
       <p:pic>
         <p:nvPicPr>
-          <p:cNvPr id="5" name="Picture 4"/>
+          <p:cNvPr id="3" name="Picture 2"/>
           <p:cNvPicPr>
             <a:picLocks noChangeAspect="1"/>
           </p:cNvPicPr>
@@ -6113,7 +6183,7 @@
         </p:blipFill>
         <p:spPr>
           <a:xfrm>
-            <a:off x="0" y="1270000"/>
+            <a:off x="0" y="1613975"/>
             <a:ext cx="9144000" cy="4295198"/>
           </a:xfrm>
           <a:prstGeom prst="rect">
@@ -6131,6 +6201,13 @@
   <p:clrMapOvr>
     <a:masterClrMapping/>
   </p:clrMapOvr>
+  <p:timing>
+    <p:tnLst>
+      <p:par>
+        <p:cTn xmlns:p14="http://schemas.microsoft.com/office/powerpoint/2010/main" id="1" dur="indefinite" restart="never" nodeType="tmRoot"/>
+      </p:par>
+    </p:tnLst>
+  </p:timing>
 </p:sld>
 </file>
 
@@ -6401,10 +6478,9 @@
               <a:buChar char="•"/>
             </a:pPr>
             <a:r>
-              <a:rPr lang="en-US" smtClean="0"/>
+              <a:rPr lang="en-US" dirty="0" smtClean="0"/>
               <a:t>If dynamic:</a:t>
             </a:r>
-            <a:endParaRPr lang="en-US" dirty="0" smtClean="0"/>
           </a:p>
           <a:p>
             <a:pPr lvl="2">
@@ -6435,8 +6511,12 @@
               <a:t>Alternative: leave in database and use </a:t>
             </a:r>
             <a:r>
-              <a:rPr lang="en-US" dirty="0" err="1"/>
-              <a:t>dbowlizer</a:t>
+              <a:rPr lang="en-US" dirty="0" err="1" smtClean="0"/>
+              <a:t>DBOWL</a:t>
+            </a:r>
+            <a:r>
+              <a:rPr lang="en-US" dirty="0" err="1" smtClean="0"/>
+              <a:t>izer</a:t>
             </a:r>
             <a:endParaRPr lang="en-US" dirty="0"/>
           </a:p>
@@ -6472,6 +6552,157 @@
     <p:extLst>
       <p:ext uri="{BB962C8B-B14F-4D97-AF65-F5344CB8AC3E}">
         <p14:creationId xmlns:p14="http://schemas.microsoft.com/office/powerpoint/2010/main" val="1458930608"/>
+      </p:ext>
+    </p:extLst>
+  </p:cSld>
+  <p:clrMapOvr>
+    <a:masterClrMapping/>
+  </p:clrMapOvr>
+  <p:timing>
+    <p:tnLst>
+      <p:par>
+        <p:cTn xmlns:p14="http://schemas.microsoft.com/office/powerpoint/2010/main" id="1" dur="indefinite" restart="never" nodeType="tmRoot"/>
+      </p:par>
+    </p:tnLst>
+  </p:timing>
+</p:sld>
+</file>
+
+<file path=ppt/slides/slide21.xml><?xml version="1.0" encoding="utf-8"?>
+<p:sld xmlns:a="http://schemas.openxmlformats.org/drawingml/2006/main" xmlns:r="http://schemas.openxmlformats.org/officeDocument/2006/relationships" xmlns:p="http://schemas.openxmlformats.org/presentationml/2006/main">
+  <p:cSld>
+    <p:spTree>
+      <p:nvGrpSpPr>
+        <p:cNvPr id="1" name=""/>
+        <p:cNvGrpSpPr/>
+        <p:nvPr/>
+      </p:nvGrpSpPr>
+      <p:grpSpPr>
+        <a:xfrm>
+          <a:off x="0" y="0"/>
+          <a:ext cx="0" cy="0"/>
+          <a:chOff x="0" y="0"/>
+          <a:chExt cx="0" cy="0"/>
+        </a:xfrm>
+      </p:grpSpPr>
+      <p:sp>
+        <p:nvSpPr>
+          <p:cNvPr id="2" name="Title 1"/>
+          <p:cNvSpPr>
+            <a:spLocks noGrp="1"/>
+          </p:cNvSpPr>
+          <p:nvPr>
+            <p:ph type="title"/>
+          </p:nvPr>
+        </p:nvSpPr>
+        <p:spPr/>
+        <p:txBody>
+          <a:bodyPr/>
+          <a:lstStyle/>
+          <a:p>
+            <a:r>
+              <a:rPr lang="en-US" dirty="0" smtClean="0"/>
+              <a:t>Resources</a:t>
+            </a:r>
+            <a:endParaRPr lang="en-US" dirty="0"/>
+          </a:p>
+        </p:txBody>
+      </p:sp>
+      <p:sp>
+        <p:nvSpPr>
+          <p:cNvPr id="3" name="Content Placeholder 2"/>
+          <p:cNvSpPr>
+            <a:spLocks noGrp="1"/>
+          </p:cNvSpPr>
+          <p:nvPr>
+            <p:ph idx="1"/>
+          </p:nvPr>
+        </p:nvSpPr>
+        <p:spPr/>
+        <p:txBody>
+          <a:bodyPr/>
+          <a:lstStyle/>
+          <a:p>
+            <a:r>
+              <a:rPr lang="en-US" dirty="0" smtClean="0"/>
+              <a:t>Example EDAC PROV-O Trace:</a:t>
+            </a:r>
+          </a:p>
+          <a:p>
+            <a:pPr marL="0" indent="0">
+              <a:buNone/>
+            </a:pPr>
+            <a:r>
+              <a:rPr lang="en-US" sz="2000" dirty="0"/>
+              <a:t>https://</a:t>
+            </a:r>
+            <a:r>
+              <a:rPr lang="en-US" sz="2000" dirty="0" err="1"/>
+              <a:t>raw.github.com</a:t>
+            </a:r>
+            <a:r>
+              <a:rPr lang="en-US" sz="2000" dirty="0"/>
+              <a:t>/</a:t>
+            </a:r>
+            <a:r>
+              <a:rPr lang="en-US" sz="2000" dirty="0" err="1"/>
+              <a:t>nicholasdelrio</a:t>
+            </a:r>
+            <a:r>
+              <a:rPr lang="en-US" sz="2000" dirty="0"/>
+              <a:t>/</a:t>
+            </a:r>
+            <a:r>
+              <a:rPr lang="en-US" sz="2000" dirty="0" err="1"/>
+              <a:t>ELSeWeb</a:t>
+            </a:r>
+            <a:r>
+              <a:rPr lang="en-US" sz="2000" dirty="0"/>
+              <a:t>/master/documents/semantic-web/</a:t>
+            </a:r>
+            <a:r>
+              <a:rPr lang="en-US" sz="2000" dirty="0" err="1"/>
+              <a:t>rdf</a:t>
+            </a:r>
+            <a:r>
+              <a:rPr lang="en-US" sz="2000" dirty="0"/>
+              <a:t>/ontology/</a:t>
+            </a:r>
+            <a:r>
+              <a:rPr lang="en-US" sz="2000" dirty="0" err="1"/>
+              <a:t>edac-prov.owl</a:t>
+            </a:r>
+            <a:endParaRPr lang="en-US" sz="2000" dirty="0"/>
+          </a:p>
+        </p:txBody>
+      </p:sp>
+      <p:sp>
+        <p:nvSpPr>
+          <p:cNvPr id="4" name="Slide Number Placeholder 3"/>
+          <p:cNvSpPr>
+            <a:spLocks noGrp="1"/>
+          </p:cNvSpPr>
+          <p:nvPr>
+            <p:ph type="sldNum" sz="quarter" idx="12"/>
+          </p:nvPr>
+        </p:nvSpPr>
+        <p:spPr/>
+        <p:txBody>
+          <a:bodyPr/>
+          <a:lstStyle/>
+          <a:p>
+            <a:fld id="{75A0D047-D3AC-D340-95A6-F602764FB084}" type="slidenum">
+              <a:rPr lang="en-US" smtClean="0"/>
+              <a:t>21</a:t>
+            </a:fld>
+            <a:endParaRPr lang="en-US"/>
+          </a:p>
+        </p:txBody>
+      </p:sp>
+    </p:spTree>
+    <p:extLst>
+      <p:ext uri="{BB962C8B-B14F-4D97-AF65-F5344CB8AC3E}">
+        <p14:creationId xmlns:p14="http://schemas.microsoft.com/office/powerpoint/2010/main" val="3371759163"/>
       </p:ext>
     </p:extLst>
   </p:cSld>
@@ -6580,7 +6811,6 @@
               <a:rPr lang="en-US" dirty="0" smtClean="0"/>
               <a:t>Data Publishing Process Revisited</a:t>
             </a:r>
-            <a:endParaRPr lang="en-US" dirty="0" smtClean="0"/>
           </a:p>
           <a:p>
             <a:pPr marL="971550" lvl="1" indent="-514350">
@@ -6595,7 +6825,6 @@
               <a:rPr lang="en-US" dirty="0" smtClean="0"/>
               <a:t>ublishing Process Ontology</a:t>
             </a:r>
-            <a:endParaRPr lang="en-US" dirty="0" smtClean="0"/>
           </a:p>
           <a:p>
             <a:pPr marL="971550" lvl="1" indent="-514350">
@@ -6606,7 +6835,6 @@
               <a:rPr lang="en-US" dirty="0" smtClean="0"/>
               <a:t>Publishing Process PROV-O Trace</a:t>
             </a:r>
-            <a:endParaRPr lang="en-US" dirty="0" smtClean="0"/>
           </a:p>
           <a:p>
             <a:pPr marL="514350" indent="-514350">
@@ -7401,7 +7629,7 @@
         </p:blipFill>
         <p:spPr>
           <a:xfrm>
-            <a:off x="317341" y="2989019"/>
+            <a:off x="317341" y="2540202"/>
             <a:ext cx="8369459" cy="3162324"/>
           </a:xfrm>
           <a:prstGeom prst="rect">
@@ -7459,6 +7687,42 @@
               <a:t>5</a:t>
             </a:fld>
             <a:endParaRPr lang="en-US"/>
+          </a:p>
+        </p:txBody>
+      </p:sp>
+      <p:sp>
+        <p:nvSpPr>
+          <p:cNvPr id="3" name="Rectangle 2"/>
+          <p:cNvSpPr/>
+          <p:nvPr/>
+        </p:nvSpPr>
+        <p:spPr>
+          <a:xfrm>
+            <a:off x="2154947" y="6171684"/>
+            <a:ext cx="4146237" cy="369332"/>
+          </a:xfrm>
+          <a:prstGeom prst="rect">
+            <a:avLst/>
+          </a:prstGeom>
+        </p:spPr>
+        <p:txBody>
+          <a:bodyPr wrap="none">
+            <a:spAutoFit/>
+          </a:bodyPr>
+          <a:lstStyle/>
+          <a:p>
+            <a:r>
+              <a:rPr lang="en-US" dirty="0"/>
+              <a:t>https://</a:t>
+            </a:r>
+            <a:r>
+              <a:rPr lang="en-US" dirty="0" err="1"/>
+              <a:t>semtools.ecoinformatics.org</a:t>
+            </a:r>
+            <a:r>
+              <a:rPr lang="en-US" dirty="0"/>
+              <a:t>/oboe</a:t>
+            </a:r>
           </a:p>
         </p:txBody>
       </p:sp>
@@ -7538,7 +7802,7 @@
         </p:blipFill>
         <p:spPr>
           <a:xfrm>
-            <a:off x="1419460" y="2879152"/>
+            <a:off x="1419460" y="2588092"/>
             <a:ext cx="5989125" cy="3806421"/>
           </a:xfrm>
           <a:prstGeom prst="rect">
@@ -7609,6 +7873,13 @@
   <p:clrMapOvr>
     <a:masterClrMapping/>
   </p:clrMapOvr>
+  <p:timing>
+    <p:tnLst>
+      <p:par>
+        <p:cTn xmlns:p14="http://schemas.microsoft.com/office/powerpoint/2010/main" id="1" dur="indefinite" restart="never" nodeType="tmRoot"/>
+      </p:par>
+    </p:tnLst>
+  </p:timing>
 </p:sld>
 </file>
 
@@ -7668,7 +7939,7 @@
         </p:blipFill>
         <p:spPr>
           <a:xfrm>
-            <a:off x="0" y="2661356"/>
+            <a:off x="0" y="2264462"/>
             <a:ext cx="9144000" cy="3367283"/>
           </a:xfrm>
           <a:prstGeom prst="rect">
@@ -7737,6 +8008,35 @@
           </a:p>
         </p:txBody>
       </p:sp>
+      <p:sp>
+        <p:nvSpPr>
+          <p:cNvPr id="3" name="Rectangle 2"/>
+          <p:cNvSpPr/>
+          <p:nvPr/>
+        </p:nvSpPr>
+        <p:spPr>
+          <a:xfrm>
+            <a:off x="457200" y="5923783"/>
+            <a:ext cx="7347444" cy="369332"/>
+          </a:xfrm>
+          <a:prstGeom prst="rect">
+            <a:avLst/>
+          </a:prstGeom>
+        </p:spPr>
+        <p:txBody>
+          <a:bodyPr wrap="square">
+            <a:spAutoFit/>
+          </a:bodyPr>
+          <a:lstStyle/>
+          <a:p>
+            <a:r>
+              <a:rPr lang="pl-PL" dirty="0"/>
+              <a:t>http://www.w3.org/TR/2013/WD-vocab-dcat-20130801/</a:t>
+            </a:r>
+            <a:endParaRPr lang="en-US" dirty="0"/>
+          </a:p>
+        </p:txBody>
+      </p:sp>
     </p:spTree>
     <p:extLst>
       <p:ext uri="{BB962C8B-B14F-4D97-AF65-F5344CB8AC3E}">
@@ -7747,6 +8047,13 @@
   <p:clrMapOvr>
     <a:masterClrMapping/>
   </p:clrMapOvr>
+  <p:timing>
+    <p:tnLst>
+      <p:par>
+        <p:cTn xmlns:p14="http://schemas.microsoft.com/office/powerpoint/2010/main" id="1" dur="indefinite" restart="never" nodeType="tmRoot"/>
+      </p:par>
+    </p:tnLst>
+  </p:timing>
 </p:sld>
 </file>
 
@@ -7906,6 +8213,42 @@
           </a:p>
         </p:txBody>
       </p:sp>
+      <p:sp>
+        <p:nvSpPr>
+          <p:cNvPr id="5" name="Rectangle 4"/>
+          <p:cNvSpPr/>
+          <p:nvPr/>
+        </p:nvSpPr>
+        <p:spPr>
+          <a:xfrm>
+            <a:off x="2733928" y="6154552"/>
+            <a:ext cx="3147015" cy="369332"/>
+          </a:xfrm>
+          <a:prstGeom prst="rect">
+            <a:avLst/>
+          </a:prstGeom>
+        </p:spPr>
+        <p:txBody>
+          <a:bodyPr wrap="none">
+            <a:spAutoFit/>
+          </a:bodyPr>
+          <a:lstStyle/>
+          <a:p>
+            <a:r>
+              <a:rPr lang="en-US" dirty="0"/>
+              <a:t>http://www.w3.org/TR/</a:t>
+            </a:r>
+            <a:r>
+              <a:rPr lang="en-US" dirty="0" err="1"/>
+              <a:t>prov</a:t>
+            </a:r>
+            <a:r>
+              <a:rPr lang="en-US" dirty="0"/>
+              <a:t>-o/</a:t>
+            </a:r>
+          </a:p>
+        </p:txBody>
+      </p:sp>
     </p:spTree>
     <p:extLst>
       <p:ext uri="{BB962C8B-B14F-4D97-AF65-F5344CB8AC3E}">
@@ -7916,6 +8259,13 @@
   <p:clrMapOvr>
     <a:masterClrMapping/>
   </p:clrMapOvr>
+  <p:timing>
+    <p:tnLst>
+      <p:par>
+        <p:cTn xmlns:p14="http://schemas.microsoft.com/office/powerpoint/2010/main" id="1" dur="indefinite" restart="never" nodeType="tmRoot"/>
+      </p:par>
+    </p:tnLst>
+  </p:timing>
 </p:sld>
 </file>
 
@@ -8104,6 +8454,13 @@
   <p:clrMapOvr>
     <a:masterClrMapping/>
   </p:clrMapOvr>
+  <p:timing>
+    <p:tnLst>
+      <p:par>
+        <p:cTn xmlns:p14="http://schemas.microsoft.com/office/powerpoint/2010/main" id="1" dur="indefinite" restart="never" nodeType="tmRoot"/>
+      </p:par>
+    </p:tnLst>
+  </p:timing>
 </p:sld>
 </file>
 

</xml_diff>